<commit_message>
lab 2 exercises ....
check lab 2 exercises
</commit_message>
<xml_diff>
--- a/lab2/Lab_week4and5_exercises.pptx
+++ b/lab2/Lab_week4and5_exercises.pptx
@@ -217,7 +217,7 @@
           </a:lstStyle>
           <a:p>
             <a:fld id="{F0A125D0-B482-1E4F-B4FC-45FC4605ED1F}" type="datetimeFigureOut">
-              <a:t>15/3/19</a:t>
+              <a:t>3/9/2023</a:t>
             </a:fld>
             <a:endParaRPr lang="en-US"/>
           </a:p>
@@ -533,7 +533,7 @@
           <a:bodyPr/>
           <a:lstStyle/>
           <a:p>
-            <a:endParaRPr lang="en-AU" dirty="0" smtClean="0"/>
+            <a:endParaRPr lang="en-AU" dirty="0"/>
           </a:p>
         </p:txBody>
       </p:sp>
@@ -559,7 +559,7 @@
               <a:pPr/>
               <a:t>1</a:t>
             </a:fld>
-            <a:endParaRPr lang="en-AU" dirty="0" smtClean="0"/>
+            <a:endParaRPr lang="en-AU" dirty="0"/>
           </a:p>
         </p:txBody>
       </p:sp>
@@ -616,12 +616,12 @@
           <a:effectLst/>
           <a:extLst>
             <a:ext uri="{909E8E84-426E-40dd-AFC4-6F175D3DCCD1}">
-              <a14:hiddenFill xmlns="" xmlns:a14="http://schemas.microsoft.com/office/drawing/2010/main">
+              <a14:hiddenFill xmlns:a14="http://schemas.microsoft.com/office/drawing/2010/main" xmlns="">
                 <a:noFill/>
               </a14:hiddenFill>
             </a:ext>
             <a:ext uri="{AF507438-7753-43e0-B8FC-AC1667EBCBE1}">
-              <a14:hiddenEffects xmlns="" xmlns:a14="http://schemas.microsoft.com/office/drawing/2010/main">
+              <a14:hiddenEffects xmlns:a14="http://schemas.microsoft.com/office/drawing/2010/main" xmlns="">
                 <a:effectLst>
                   <a:outerShdw blurRad="63500" dist="38099" dir="2700000" algn="ctr" rotWithShape="0">
                     <a:schemeClr val="bg2">
@@ -683,7 +683,7 @@
           <a:p>
             <a:pPr lvl="0"/>
             <a:r>
-              <a:rPr lang="en-US" noProof="0" smtClean="0"/>
+              <a:rPr lang="en-US" noProof="0"/>
               <a:t>Click to edit Master title style</a:t>
             </a:r>
           </a:p>
@@ -717,7 +717,7 @@
           <a:p>
             <a:pPr lvl="0"/>
             <a:r>
-              <a:rPr lang="en-US" noProof="0" smtClean="0"/>
+              <a:rPr lang="en-US" noProof="0"/>
               <a:t>Click to edit Master subtitle style</a:t>
             </a:r>
           </a:p>
@@ -1478,7 +1478,7 @@
           <a:lstStyle/>
           <a:p>
             <a:fld id="{FF25446E-AE3A-F541-A88A-AF909C724E6B}" type="datetimeFigureOut">
-              <a:t>15/3/19</a:t>
+              <a:t>3/9/2023</a:t>
             </a:fld>
             <a:endParaRPr lang="en-US"/>
           </a:p>
@@ -1646,7 +1646,7 @@
           <a:lstStyle/>
           <a:p>
             <a:fld id="{FF25446E-AE3A-F541-A88A-AF909C724E6B}" type="datetimeFigureOut">
-              <a:t>15/3/19</a:t>
+              <a:t>3/9/2023</a:t>
             </a:fld>
             <a:endParaRPr lang="en-US"/>
           </a:p>
@@ -1890,7 +1890,7 @@
           <a:lstStyle/>
           <a:p>
             <a:fld id="{FF25446E-AE3A-F541-A88A-AF909C724E6B}" type="datetimeFigureOut">
-              <a:t>15/3/19</a:t>
+              <a:t>3/9/2023</a:t>
             </a:fld>
             <a:endParaRPr lang="en-US"/>
           </a:p>
@@ -2176,7 +2176,7 @@
           <a:lstStyle/>
           <a:p>
             <a:fld id="{FF25446E-AE3A-F541-A88A-AF909C724E6B}" type="datetimeFigureOut">
-              <a:t>15/3/19</a:t>
+              <a:t>3/9/2023</a:t>
             </a:fld>
             <a:endParaRPr lang="en-US"/>
           </a:p>
@@ -2596,7 +2596,7 @@
           <a:lstStyle/>
           <a:p>
             <a:fld id="{FF25446E-AE3A-F541-A88A-AF909C724E6B}" type="datetimeFigureOut">
-              <a:t>15/3/19</a:t>
+              <a:t>3/9/2023</a:t>
             </a:fld>
             <a:endParaRPr lang="en-US"/>
           </a:p>
@@ -2712,7 +2712,7 @@
           <a:lstStyle/>
           <a:p>
             <a:fld id="{FF25446E-AE3A-F541-A88A-AF909C724E6B}" type="datetimeFigureOut">
-              <a:t>15/3/19</a:t>
+              <a:t>3/9/2023</a:t>
             </a:fld>
             <a:endParaRPr lang="en-US"/>
           </a:p>
@@ -2805,7 +2805,7 @@
           <a:lstStyle/>
           <a:p>
             <a:fld id="{FF25446E-AE3A-F541-A88A-AF909C724E6B}" type="datetimeFigureOut">
-              <a:t>15/3/19</a:t>
+              <a:t>3/9/2023</a:t>
             </a:fld>
             <a:endParaRPr lang="en-US"/>
           </a:p>
@@ -3080,7 +3080,7 @@
           <a:lstStyle/>
           <a:p>
             <a:fld id="{FF25446E-AE3A-F541-A88A-AF909C724E6B}" type="datetimeFigureOut">
-              <a:t>15/3/19</a:t>
+              <a:t>3/9/2023</a:t>
             </a:fld>
             <a:endParaRPr lang="en-US"/>
           </a:p>
@@ -3543,7 +3543,7 @@
           <a:lstStyle/>
           <a:p>
             <a:fld id="{FF25446E-AE3A-F541-A88A-AF909C724E6B}" type="datetimeFigureOut">
-              <a:t>15/3/19</a:t>
+              <a:t>3/9/2023</a:t>
             </a:fld>
             <a:endParaRPr lang="en-US"/>
           </a:p>
@@ -3711,7 +3711,7 @@
           <a:lstStyle/>
           <a:p>
             <a:fld id="{FF25446E-AE3A-F541-A88A-AF909C724E6B}" type="datetimeFigureOut">
-              <a:t>15/3/19</a:t>
+              <a:t>3/9/2023</a:t>
             </a:fld>
             <a:endParaRPr lang="en-US"/>
           </a:p>
@@ -3889,7 +3889,7 @@
           <a:lstStyle/>
           <a:p>
             <a:fld id="{FF25446E-AE3A-F541-A88A-AF909C724E6B}" type="datetimeFigureOut">
-              <a:t>15/3/19</a:t>
+              <a:t>3/9/2023</a:t>
             </a:fld>
             <a:endParaRPr lang="en-US"/>
           </a:p>
@@ -5705,7 +5705,7 @@
           </a:lstStyle>
           <a:p>
             <a:pPr lvl="0"/>
-            <a:endParaRPr lang="en-US" noProof="0" smtClean="0"/>
+            <a:endParaRPr lang="en-US" noProof="0"/>
           </a:p>
         </p:txBody>
       </p:sp>
@@ -5952,7 +5952,7 @@
           <a:effectLst/>
           <a:extLst>
             <a:ext uri="{91240B29-F687-4f45-9708-019B960494DF}">
-              <a14:hiddenLine xmlns="" xmlns:a14="http://schemas.microsoft.com/office/drawing/2010/main" w="9525">
+              <a14:hiddenLine xmlns:a14="http://schemas.microsoft.com/office/drawing/2010/main" xmlns="" w="9525">
                 <a:solidFill>
                   <a:schemeClr val="tx1"/>
                 </a:solidFill>
@@ -5962,7 +5962,7 @@
               </a14:hiddenLine>
             </a:ext>
             <a:ext uri="{AF507438-7753-43e0-B8FC-AC1667EBCBE1}">
-              <a14:hiddenEffects xmlns="" xmlns:a14="http://schemas.microsoft.com/office/drawing/2010/main">
+              <a14:hiddenEffects xmlns:a14="http://schemas.microsoft.com/office/drawing/2010/main" xmlns="">
                 <a:effectLst>
                   <a:outerShdw blurRad="63500" dist="38099" dir="2700000" algn="ctr" rotWithShape="0">
                     <a:schemeClr val="bg2">
@@ -6037,7 +6037,7 @@
           <a:effectLst/>
           <a:extLst>
             <a:ext uri="{91240B29-F687-4f45-9708-019B960494DF}">
-              <a14:hiddenLine xmlns="" xmlns:a14="http://schemas.microsoft.com/office/drawing/2010/main" w="9525">
+              <a14:hiddenLine xmlns:a14="http://schemas.microsoft.com/office/drawing/2010/main" xmlns="" w="9525">
                 <a:solidFill>
                   <a:schemeClr val="tx1"/>
                 </a:solidFill>
@@ -6047,7 +6047,7 @@
               </a14:hiddenLine>
             </a:ext>
             <a:ext uri="{AF507438-7753-43e0-B8FC-AC1667EBCBE1}">
-              <a14:hiddenEffects xmlns="" xmlns:a14="http://schemas.microsoft.com/office/drawing/2010/main">
+              <a14:hiddenEffects xmlns:a14="http://schemas.microsoft.com/office/drawing/2010/main" xmlns="">
                 <a:effectLst>
                   <a:outerShdw blurRad="63500" dist="38099" dir="2700000" algn="ctr" rotWithShape="0">
                     <a:schemeClr val="bg2">
@@ -6116,7 +6116,7 @@
           <a:effectLst/>
           <a:extLst>
             <a:ext uri="{91240B29-F687-4f45-9708-019B960494DF}">
-              <a14:hiddenLine xmlns="" xmlns:a14="http://schemas.microsoft.com/office/drawing/2010/main" w="9525">
+              <a14:hiddenLine xmlns:a14="http://schemas.microsoft.com/office/drawing/2010/main" xmlns="" w="9525">
                 <a:solidFill>
                   <a:schemeClr val="tx1"/>
                 </a:solidFill>
@@ -6126,7 +6126,7 @@
               </a14:hiddenLine>
             </a:ext>
             <a:ext uri="{AF507438-7753-43e0-B8FC-AC1667EBCBE1}">
-              <a14:hiddenEffects xmlns="" xmlns:a14="http://schemas.microsoft.com/office/drawing/2010/main">
+              <a14:hiddenEffects xmlns:a14="http://schemas.microsoft.com/office/drawing/2010/main" xmlns="">
                 <a:effectLst>
                   <a:outerShdw blurRad="63500" dist="38099" dir="2700000" algn="ctr" rotWithShape="0">
                     <a:schemeClr val="bg2">
@@ -6203,7 +6203,7 @@
             <a:effectLst/>
             <a:extLst>
               <a:ext uri="{91240B29-F687-4f45-9708-019B960494DF}">
-                <a14:hiddenLine xmlns="" xmlns:a14="http://schemas.microsoft.com/office/drawing/2010/main" w="9525">
+                <a14:hiddenLine xmlns:a14="http://schemas.microsoft.com/office/drawing/2010/main" xmlns="" w="9525">
                   <a:solidFill>
                     <a:schemeClr val="tx1"/>
                   </a:solidFill>
@@ -6213,7 +6213,7 @@
                 </a14:hiddenLine>
               </a:ext>
               <a:ext uri="{AF507438-7753-43e0-B8FC-AC1667EBCBE1}">
-                <a14:hiddenEffects xmlns="" xmlns:a14="http://schemas.microsoft.com/office/drawing/2010/main">
+                <a14:hiddenEffects xmlns:a14="http://schemas.microsoft.com/office/drawing/2010/main" xmlns="">
                   <a:effectLst>
                     <a:outerShdw blurRad="63500" dist="38099" dir="2700000" algn="ctr" rotWithShape="0">
                       <a:schemeClr val="bg2">
@@ -6282,7 +6282,7 @@
             <a:effectLst/>
             <a:extLst>
               <a:ext uri="{91240B29-F687-4f45-9708-019B960494DF}">
-                <a14:hiddenLine xmlns="" xmlns:a14="http://schemas.microsoft.com/office/drawing/2010/main" w="9525">
+                <a14:hiddenLine xmlns:a14="http://schemas.microsoft.com/office/drawing/2010/main" xmlns="" w="9525">
                   <a:solidFill>
                     <a:schemeClr val="tx1"/>
                   </a:solidFill>
@@ -6292,7 +6292,7 @@
                 </a14:hiddenLine>
               </a:ext>
               <a:ext uri="{AF507438-7753-43e0-B8FC-AC1667EBCBE1}">
-                <a14:hiddenEffects xmlns="" xmlns:a14="http://schemas.microsoft.com/office/drawing/2010/main">
+                <a14:hiddenEffects xmlns:a14="http://schemas.microsoft.com/office/drawing/2010/main" xmlns="">
                   <a:effectLst>
                     <a:outerShdw blurRad="63500" dist="38099" dir="2700000" algn="ctr" rotWithShape="0">
                       <a:schemeClr val="bg2">
@@ -6354,17 +6354,17 @@
           <a:effectLst/>
           <a:extLst>
             <a:ext uri="{FAA26D3D-D897-4be2-8F04-BA451C77F1D7}">
-              <ma14:placeholderFlag xmlns:ma14="http://schemas.microsoft.com/office/mac/drawingml/2011/main" val="1"/>
+              <ma14:placeholderFlag xmlns:ma14="http://schemas.microsoft.com/office/mac/drawingml/2011/main" xmlns="" val="1"/>
             </a:ext>
             <a:ext uri="{909E8E84-426E-40dd-AFC4-6F175D3DCCD1}">
-              <a14:hiddenFill xmlns="" xmlns:a14="http://schemas.microsoft.com/office/drawing/2010/main">
+              <a14:hiddenFill xmlns:a14="http://schemas.microsoft.com/office/drawing/2010/main" xmlns="">
                 <a:solidFill>
                   <a:schemeClr val="accent1"/>
                 </a:solidFill>
               </a14:hiddenFill>
             </a:ext>
             <a:ext uri="{91240B29-F687-4f45-9708-019B960494DF}">
-              <a14:hiddenLine xmlns="" xmlns:a14="http://schemas.microsoft.com/office/drawing/2010/main" w="9525">
+              <a14:hiddenLine xmlns:a14="http://schemas.microsoft.com/office/drawing/2010/main" xmlns="" w="9525">
                 <a:solidFill>
                   <a:schemeClr val="tx1"/>
                 </a:solidFill>
@@ -6374,7 +6374,7 @@
               </a14:hiddenLine>
             </a:ext>
             <a:ext uri="{AF507438-7753-43e0-B8FC-AC1667EBCBE1}">
-              <a14:hiddenEffects xmlns="" xmlns:a14="http://schemas.microsoft.com/office/drawing/2010/main">
+              <a14:hiddenEffects xmlns:a14="http://schemas.microsoft.com/office/drawing/2010/main" xmlns="">
                 <a:effectLst>
                   <a:outerShdw blurRad="63500" dist="38099" dir="2700000" algn="ctr" rotWithShape="0">
                     <a:schemeClr val="bg2">
@@ -6427,17 +6427,17 @@
           <a:effectLst/>
           <a:extLst>
             <a:ext uri="{FAA26D3D-D897-4be2-8F04-BA451C77F1D7}">
-              <ma14:placeholderFlag xmlns:ma14="http://schemas.microsoft.com/office/mac/drawingml/2011/main" val="1"/>
+              <ma14:placeholderFlag xmlns:ma14="http://schemas.microsoft.com/office/mac/drawingml/2011/main" xmlns="" val="1"/>
             </a:ext>
             <a:ext uri="{909E8E84-426E-40dd-AFC4-6F175D3DCCD1}">
-              <a14:hiddenFill xmlns="" xmlns:a14="http://schemas.microsoft.com/office/drawing/2010/main">
+              <a14:hiddenFill xmlns:a14="http://schemas.microsoft.com/office/drawing/2010/main" xmlns="">
                 <a:solidFill>
                   <a:schemeClr val="accent1"/>
                 </a:solidFill>
               </a14:hiddenFill>
             </a:ext>
             <a:ext uri="{91240B29-F687-4f45-9708-019B960494DF}">
-              <a14:hiddenLine xmlns="" xmlns:a14="http://schemas.microsoft.com/office/drawing/2010/main" w="9525">
+              <a14:hiddenLine xmlns:a14="http://schemas.microsoft.com/office/drawing/2010/main" xmlns="" w="9525">
                 <a:solidFill>
                   <a:schemeClr val="tx1"/>
                 </a:solidFill>
@@ -6447,7 +6447,7 @@
               </a14:hiddenLine>
             </a:ext>
             <a:ext uri="{AF507438-7753-43e0-B8FC-AC1667EBCBE1}">
-              <a14:hiddenEffects xmlns="" xmlns:a14="http://schemas.microsoft.com/office/drawing/2010/main">
+              <a14:hiddenEffects xmlns:a14="http://schemas.microsoft.com/office/drawing/2010/main" xmlns="">
                 <a:effectLst>
                   <a:outerShdw blurRad="63500" dist="38099" dir="2700000" algn="ctr" rotWithShape="0">
                     <a:schemeClr val="bg2">
@@ -6528,17 +6528,17 @@
           <a:effectLst/>
           <a:extLst>
             <a:ext uri="{FAA26D3D-D897-4be2-8F04-BA451C77F1D7}">
-              <ma14:placeholderFlag xmlns:ma14="http://schemas.microsoft.com/office/mac/drawingml/2011/main" val="1"/>
+              <ma14:placeholderFlag xmlns:ma14="http://schemas.microsoft.com/office/mac/drawingml/2011/main" xmlns="" val="1"/>
             </a:ext>
             <a:ext uri="{909E8E84-426E-40dd-AFC4-6F175D3DCCD1}">
-              <a14:hiddenFill xmlns="" xmlns:a14="http://schemas.microsoft.com/office/drawing/2010/main">
+              <a14:hiddenFill xmlns:a14="http://schemas.microsoft.com/office/drawing/2010/main" xmlns="">
                 <a:solidFill>
                   <a:schemeClr val="accent1"/>
                 </a:solidFill>
               </a14:hiddenFill>
             </a:ext>
             <a:ext uri="{91240B29-F687-4f45-9708-019B960494DF}">
-              <a14:hiddenLine xmlns="" xmlns:a14="http://schemas.microsoft.com/office/drawing/2010/main" w="9525">
+              <a14:hiddenLine xmlns:a14="http://schemas.microsoft.com/office/drawing/2010/main" xmlns="" w="9525">
                 <a:solidFill>
                   <a:schemeClr val="tx1"/>
                 </a:solidFill>
@@ -6548,7 +6548,7 @@
               </a14:hiddenLine>
             </a:ext>
             <a:ext uri="{AF507438-7753-43e0-B8FC-AC1667EBCBE1}">
-              <a14:hiddenEffects xmlns="" xmlns:a14="http://schemas.microsoft.com/office/drawing/2010/main">
+              <a14:hiddenEffects xmlns:a14="http://schemas.microsoft.com/office/drawing/2010/main" xmlns="">
                 <a:effectLst>
                   <a:outerShdw blurRad="63500" dist="38099" dir="2700000" algn="ctr" rotWithShape="0">
                     <a:schemeClr val="bg2">
@@ -6618,17 +6618,17 @@
           <a:effectLst/>
           <a:extLst>
             <a:ext uri="{FAA26D3D-D897-4be2-8F04-BA451C77F1D7}">
-              <ma14:placeholderFlag xmlns:ma14="http://schemas.microsoft.com/office/mac/drawingml/2011/main" val="1"/>
+              <ma14:placeholderFlag xmlns:ma14="http://schemas.microsoft.com/office/mac/drawingml/2011/main" xmlns="" val="1"/>
             </a:ext>
             <a:ext uri="{909E8E84-426E-40dd-AFC4-6F175D3DCCD1}">
-              <a14:hiddenFill xmlns="" xmlns:a14="http://schemas.microsoft.com/office/drawing/2010/main">
+              <a14:hiddenFill xmlns:a14="http://schemas.microsoft.com/office/drawing/2010/main" xmlns="">
                 <a:solidFill>
                   <a:schemeClr val="accent1"/>
                 </a:solidFill>
               </a14:hiddenFill>
             </a:ext>
             <a:ext uri="{91240B29-F687-4f45-9708-019B960494DF}">
-              <a14:hiddenLine xmlns="" xmlns:a14="http://schemas.microsoft.com/office/drawing/2010/main" w="9525">
+              <a14:hiddenLine xmlns:a14="http://schemas.microsoft.com/office/drawing/2010/main" xmlns="" w="9525">
                 <a:solidFill>
                   <a:schemeClr val="tx1"/>
                 </a:solidFill>
@@ -6638,7 +6638,7 @@
               </a14:hiddenLine>
             </a:ext>
             <a:ext uri="{AF507438-7753-43e0-B8FC-AC1667EBCBE1}">
-              <a14:hiddenEffects xmlns="" xmlns:a14="http://schemas.microsoft.com/office/drawing/2010/main">
+              <a14:hiddenEffects xmlns:a14="http://schemas.microsoft.com/office/drawing/2010/main" xmlns="">
                 <a:effectLst>
                   <a:outerShdw blurRad="63500" dist="38099" dir="2700000" algn="ctr" rotWithShape="0">
                     <a:schemeClr val="bg2">
@@ -6708,17 +6708,17 @@
           <a:effectLst/>
           <a:extLst>
             <a:ext uri="{FAA26D3D-D897-4be2-8F04-BA451C77F1D7}">
-              <ma14:placeholderFlag xmlns:ma14="http://schemas.microsoft.com/office/mac/drawingml/2011/main" val="1"/>
+              <ma14:placeholderFlag xmlns:ma14="http://schemas.microsoft.com/office/mac/drawingml/2011/main" xmlns="" val="1"/>
             </a:ext>
             <a:ext uri="{909E8E84-426E-40dd-AFC4-6F175D3DCCD1}">
-              <a14:hiddenFill xmlns="" xmlns:a14="http://schemas.microsoft.com/office/drawing/2010/main">
+              <a14:hiddenFill xmlns:a14="http://schemas.microsoft.com/office/drawing/2010/main" xmlns="">
                 <a:solidFill>
                   <a:schemeClr val="accent1"/>
                 </a:solidFill>
               </a14:hiddenFill>
             </a:ext>
             <a:ext uri="{91240B29-F687-4f45-9708-019B960494DF}">
-              <a14:hiddenLine xmlns="" xmlns:a14="http://schemas.microsoft.com/office/drawing/2010/main" w="9525">
+              <a14:hiddenLine xmlns:a14="http://schemas.microsoft.com/office/drawing/2010/main" xmlns="" w="9525">
                 <a:solidFill>
                   <a:schemeClr val="tx1"/>
                 </a:solidFill>
@@ -6728,7 +6728,7 @@
               </a14:hiddenLine>
             </a:ext>
             <a:ext uri="{AF507438-7753-43e0-B8FC-AC1667EBCBE1}">
-              <a14:hiddenEffects xmlns="" xmlns:a14="http://schemas.microsoft.com/office/drawing/2010/main">
+              <a14:hiddenEffects xmlns:a14="http://schemas.microsoft.com/office/drawing/2010/main" xmlns="">
                 <a:effectLst>
                   <a:outerShdw blurRad="63500" dist="38099" dir="2700000" algn="ctr" rotWithShape="0">
                     <a:schemeClr val="bg2">
@@ -7409,7 +7409,7 @@
           </a:lstStyle>
           <a:p>
             <a:fld id="{FF25446E-AE3A-F541-A88A-AF909C724E6B}" type="datetimeFigureOut">
-              <a:t>15/3/19</a:t>
+              <a:t>3/9/2023</a:t>
             </a:fld>
             <a:endParaRPr lang="en-US"/>
           </a:p>
@@ -7806,17 +7806,8 @@
           </a:bodyPr>
           <a:lstStyle/>
           <a:p>
-            <a:r>
-              <a:rPr lang="en-US" sz="3600" b="1" smtClean="0">
-                <a:solidFill>
-                  <a:prstClr val="black"/>
-                </a:solidFill>
-                <a:latin typeface="Garamond" pitchFamily="18" charset="0"/>
-              </a:rPr>
-              <a:t/>
-            </a:r>
             <a:br>
-              <a:rPr lang="en-US" sz="3600" b="1" smtClean="0">
+              <a:rPr lang="en-US" sz="3600" b="1">
                 <a:solidFill>
                   <a:prstClr val="black"/>
                 </a:solidFill>
@@ -7824,22 +7815,13 @@
               </a:rPr>
             </a:br>
             <a:r>
-              <a:rPr lang="en-US" sz="3600" b="1" smtClean="0">
+              <a:rPr lang="en-US" sz="3600" b="1">
                 <a:solidFill>
                   <a:prstClr val="black"/>
                 </a:solidFill>
                 <a:latin typeface="Garamond" pitchFamily="18" charset="0"/>
               </a:rPr>
               <a:t>Computational Neuroscience</a:t>
-            </a:r>
-            <a:r>
-              <a:rPr lang="en-US" b="1">
-                <a:solidFill>
-                  <a:prstClr val="black"/>
-                </a:solidFill>
-                <a:latin typeface="Garamond" pitchFamily="18" charset="0"/>
-              </a:rPr>
-              <a:t/>
             </a:r>
             <a:br>
               <a:rPr lang="en-US" b="1">
@@ -7849,15 +7831,6 @@
                 <a:latin typeface="Garamond" pitchFamily="18" charset="0"/>
               </a:rPr>
             </a:br>
-            <a:r>
-              <a:rPr lang="en-US" sz="4400">
-                <a:solidFill>
-                  <a:prstClr val="black"/>
-                </a:solidFill>
-                <a:latin typeface="Garamond" pitchFamily="18" charset="0"/>
-              </a:rPr>
-              <a:t/>
-            </a:r>
             <a:br>
               <a:rPr lang="en-US" sz="4400">
                 <a:solidFill>
@@ -7873,74 +7846,33 @@
             <a:br>
               <a:rPr lang="en-US" sz="4000" b="0"/>
             </a:br>
-            <a:r>
-              <a:rPr lang="en-US" sz="4000" b="0"/>
-              <a:t/>
-            </a:r>
             <a:br>
               <a:rPr lang="en-US" sz="4000" b="0"/>
             </a:br>
-            <a:r>
-              <a:rPr lang="en-US" sz="4000"/>
-              <a:t/>
-            </a:r>
             <a:br>
               <a:rPr lang="en-US" sz="4000"/>
             </a:br>
-            <a:r>
-              <a:rPr lang="en-US" sz="4000"/>
-              <a:t/>
-            </a:r>
             <a:br>
               <a:rPr lang="en-US" sz="4000"/>
             </a:br>
-            <a:r>
-              <a:rPr lang="en-US" sz="2400"/>
-              <a:t/>
-            </a:r>
             <a:br>
               <a:rPr lang="en-US" sz="2400"/>
             </a:br>
-            <a:r>
-              <a:rPr lang="en-US" sz="2400"/>
-              <a:t/>
-            </a:r>
             <a:br>
               <a:rPr lang="en-US" sz="2400"/>
             </a:br>
-            <a:r>
-              <a:rPr lang="en-US" sz="2400"/>
-              <a:t/>
-            </a:r>
             <a:br>
               <a:rPr lang="en-US" sz="2400"/>
             </a:br>
-            <a:r>
-              <a:rPr lang="en-US" sz="2400"/>
-              <a:t/>
-            </a:r>
             <a:br>
               <a:rPr lang="en-US" sz="2400"/>
             </a:br>
-            <a:r>
-              <a:rPr lang="en-US" sz="2400"/>
-              <a:t/>
-            </a:r>
             <a:br>
               <a:rPr lang="en-US" sz="2400"/>
             </a:br>
             <a:r>
               <a:rPr lang="en-US" sz="2400"/>
               <a:t>Instructor: Salvador Dura-Berna</a:t>
-            </a:r>
-            <a:r>
-              <a:rPr lang="en-US" sz="3200" b="1">
-                <a:solidFill>
-                  <a:prstClr val="black"/>
-                </a:solidFill>
-                <a:latin typeface="Garamond" pitchFamily="18" charset="0"/>
-              </a:rPr>
-              <a:t/>
             </a:r>
             <a:br>
               <a:rPr lang="en-US" sz="3200" b="1">
@@ -7950,7 +7882,7 @@
                 <a:latin typeface="Garamond" pitchFamily="18" charset="0"/>
               </a:rPr>
             </a:br>
-            <a:endParaRPr lang="en-AU" sz="3200" b="1" dirty="0" smtClean="0"/>
+            <a:endParaRPr lang="en-AU" sz="3200" b="1" dirty="0"/>
           </a:p>
         </p:txBody>
       </p:sp>
@@ -7988,13 +7920,6 @@
   <p:clrMapOvr>
     <a:masterClrMapping/>
   </p:clrMapOvr>
-  <p:timing>
-    <p:tnLst>
-      <p:par>
-        <p:cTn id="1" dur="indefinite" restart="never" nodeType="tmRoot"/>
-      </p:par>
-    </p:tnLst>
-  </p:timing>
 </p:sld>
 </file>
 
@@ -8031,7 +7956,7 @@
           <a:lstStyle/>
           <a:p>
             <a:r>
-              <a:rPr lang="en-US" sz="3600" smtClean="0"/>
+              <a:rPr lang="en-US" sz="3600"/>
               <a:t>Bonus: Add an axon</a:t>
             </a:r>
             <a:endParaRPr lang="en-AU" sz="3600"/>
@@ -8178,13 +8103,6 @@
   <p:clrMapOvr>
     <a:masterClrMapping/>
   </p:clrMapOvr>
-  <p:timing>
-    <p:tnLst>
-      <p:par>
-        <p:cTn id="1" dur="indefinite" restart="never" nodeType="tmRoot"/>
-      </p:par>
-    </p:tnLst>
-  </p:timing>
 </p:sld>
 </file>
 
@@ -8221,7 +8139,7 @@
           <a:lstStyle/>
           <a:p>
             <a:r>
-              <a:rPr lang="en-US" sz="3600" smtClean="0"/>
+              <a:rPr lang="en-US" sz="3600"/>
               <a:t>Exercise Week 4</a:t>
             </a:r>
             <a:endParaRPr lang="en-AU" sz="3600"/>
@@ -8335,13 +8253,6 @@
   <p:clrMapOvr>
     <a:masterClrMapping/>
   </p:clrMapOvr>
-  <p:timing>
-    <p:tnLst>
-      <p:par>
-        <p:cTn id="1" dur="indefinite" restart="never" nodeType="tmRoot"/>
-      </p:par>
-    </p:tnLst>
-  </p:timing>
 </p:sld>
 </file>
 
@@ -8378,7 +8289,7 @@
           <a:lstStyle/>
           <a:p>
             <a:r>
-              <a:rPr lang="en-US" sz="3600" smtClean="0"/>
+              <a:rPr lang="en-US" sz="3600"/>
               <a:t>Week 5 - Modify cell properties</a:t>
             </a:r>
             <a:endParaRPr lang="en-AU" sz="3600"/>
@@ -8467,13 +8378,6 @@
   <p:clrMapOvr>
     <a:masterClrMapping/>
   </p:clrMapOvr>
-  <p:timing>
-    <p:tnLst>
-      <p:par>
-        <p:cTn id="1" dur="indefinite" restart="never" nodeType="tmRoot"/>
-      </p:par>
-    </p:tnLst>
-  </p:timing>
 </p:sld>
 </file>
 
@@ -8510,7 +8414,7 @@
           <a:lstStyle/>
           <a:p>
             <a:r>
-              <a:rPr lang="en-US" sz="3600" smtClean="0"/>
+              <a:rPr lang="en-US" sz="3600"/>
               <a:t>Modify cell properties</a:t>
             </a:r>
             <a:endParaRPr lang="en-AU" sz="3600"/>
@@ -8615,13 +8519,6 @@
   <p:clrMapOvr>
     <a:masterClrMapping/>
   </p:clrMapOvr>
-  <p:timing>
-    <p:tnLst>
-      <p:par>
-        <p:cTn id="1" dur="indefinite" restart="never" nodeType="tmRoot"/>
-      </p:par>
-    </p:tnLst>
-  </p:timing>
 </p:sld>
 </file>
 
@@ -8658,7 +8555,7 @@
           <a:lstStyle/>
           <a:p>
             <a:r>
-              <a:rPr lang="en-US" sz="3600" smtClean="0"/>
+              <a:rPr lang="en-US" sz="3600"/>
               <a:t>Iterate cell mechanisms</a:t>
             </a:r>
             <a:endParaRPr lang="en-AU" sz="3600"/>
@@ -9000,13 +8897,6 @@
   <p:clrMapOvr>
     <a:masterClrMapping/>
   </p:clrMapOvr>
-  <p:timing>
-    <p:tnLst>
-      <p:par>
-        <p:cTn id="1" dur="indefinite" restart="never" nodeType="tmRoot"/>
-      </p:par>
-    </p:tnLst>
-  </p:timing>
 </p:sld>
 </file>
 
@@ -9043,7 +8933,7 @@
           <a:lstStyle/>
           <a:p>
             <a:r>
-              <a:rPr lang="en-US" sz="3600" smtClean="0"/>
+              <a:rPr lang="en-US" sz="3600"/>
               <a:t>Modify current clamp + add alpha syn</a:t>
             </a:r>
             <a:endParaRPr lang="en-AU" sz="3600"/>
@@ -9204,13 +9094,6 @@
   <p:clrMapOvr>
     <a:masterClrMapping/>
   </p:clrMapOvr>
-  <p:timing>
-    <p:tnLst>
-      <p:par>
-        <p:cTn id="1" dur="indefinite" restart="never" nodeType="tmRoot"/>
-      </p:par>
-    </p:tnLst>
-  </p:timing>
 </p:sld>
 </file>
 
@@ -9247,7 +9130,7 @@
           <a:lstStyle/>
           <a:p>
             <a:r>
-              <a:rPr lang="en-US" sz="3600" smtClean="0"/>
+              <a:rPr lang="en-US" sz="3600"/>
               <a:t>Add voltage clamp</a:t>
             </a:r>
             <a:endParaRPr lang="en-AU" sz="3600"/>
@@ -9357,13 +9240,6 @@
   <p:clrMapOvr>
     <a:masterClrMapping/>
   </p:clrMapOvr>
-  <p:timing>
-    <p:tnLst>
-      <p:par>
-        <p:cTn id="1" dur="indefinite" restart="never" nodeType="tmRoot"/>
-      </p:par>
-    </p:tnLst>
-  </p:timing>
 </p:sld>
 </file>
 
@@ -9400,7 +9276,7 @@
           <a:lstStyle/>
           <a:p>
             <a:r>
-              <a:rPr lang="en-US" sz="3600" smtClean="0"/>
+              <a:rPr lang="en-US" sz="3600"/>
               <a:t>Simulation</a:t>
             </a:r>
             <a:endParaRPr lang="en-AU" sz="3600"/>
@@ -9471,13 +9347,6 @@
   <p:clrMapOvr>
     <a:masterClrMapping/>
   </p:clrMapOvr>
-  <p:timing>
-    <p:tnLst>
-      <p:par>
-        <p:cTn id="1" dur="indefinite" restart="never" nodeType="tmRoot"/>
-      </p:par>
-    </p:tnLst>
-  </p:timing>
 </p:sld>
 </file>
 
@@ -9514,7 +9383,7 @@
           <a:lstStyle/>
           <a:p>
             <a:r>
-              <a:rPr lang="en-US" sz="3600" smtClean="0"/>
+              <a:rPr lang="en-US" sz="3600"/>
               <a:t>Change dendritic length </a:t>
             </a:r>
             <a:endParaRPr lang="en-AU" sz="3600"/>
@@ -9630,13 +9499,6 @@
   <p:clrMapOvr>
     <a:masterClrMapping/>
   </p:clrMapOvr>
-  <p:timing>
-    <p:tnLst>
-      <p:par>
-        <p:cTn id="1" dur="indefinite" restart="never" nodeType="tmRoot"/>
-      </p:par>
-    </p:tnLst>
-  </p:timing>
 </p:sld>
 </file>
 
@@ -9886,7 +9748,7 @@
         <a:effectLst/>
         <a:extLst>
           <a:ext uri="{AF507438-7753-43e0-B8FC-AC1667EBCBE1}">
-            <a14:hiddenEffects xmlns="" xmlns:a14="http://schemas.microsoft.com/office/drawing/2010/main">
+            <a14:hiddenEffects xmlns:a14="http://schemas.microsoft.com/office/drawing/2010/main" xmlns="">
               <a:effectLst>
                 <a:outerShdw blurRad="63500" dist="35921" dir="2700000" algn="ctr" rotWithShape="0">
                   <a:schemeClr val="bg2"/>
@@ -9961,7 +9823,7 @@
         <a:effectLst/>
         <a:extLst>
           <a:ext uri="{AF507438-7753-43e0-B8FC-AC1667EBCBE1}">
-            <a14:hiddenEffects xmlns="" xmlns:a14="http://schemas.microsoft.com/office/drawing/2010/main">
+            <a14:hiddenEffects xmlns:a14="http://schemas.microsoft.com/office/drawing/2010/main" xmlns="">
               <a:effectLst>
                 <a:outerShdw blurRad="63500" dist="35921" dir="2700000" algn="ctr" rotWithShape="0">
                   <a:schemeClr val="bg2"/>

</xml_diff>